<commit_message>
modifying Session1 code and hiding a slide in Session3
</commit_message>
<xml_diff>
--- a/Session3/Session3_Slides.pptx
+++ b/Session3/Session3_Slides.pptx
@@ -13370,7 +13370,7 @@
           </a:ln>
           <a:extLst>
             <a:ext uri="{C572A759-6A51-4108-AA02-DFA0A04FC94B}">
-              <ma14:wrappingTextBoxFlag xmlns="" xmlns:ma14="http://schemas.microsoft.com/office/mac/drawingml/2011/main" val="1"/>
+              <ma14:wrappingTextBoxFlag xmlns:ma14="http://schemas.microsoft.com/office/mac/drawingml/2011/main" xmlns="" val="1"/>
             </a:ext>
           </a:extLst>
         </p:spPr>
@@ -13409,7 +13409,7 @@
           </a:ln>
           <a:extLst>
             <a:ext uri="{C572A759-6A51-4108-AA02-DFA0A04FC94B}">
-              <ma14:wrappingTextBoxFlag xmlns="" xmlns:ma14="http://schemas.microsoft.com/office/mac/drawingml/2011/main" val="1"/>
+              <ma14:wrappingTextBoxFlag xmlns:ma14="http://schemas.microsoft.com/office/mac/drawingml/2011/main" xmlns="" val="1"/>
             </a:ext>
           </a:extLst>
         </p:spPr>
@@ -14466,7 +14466,7 @@
           </a:ln>
           <a:extLst>
             <a:ext uri="{C572A759-6A51-4108-AA02-DFA0A04FC94B}">
-              <ma14:wrappingTextBoxFlag xmlns="" xmlns:ma14="http://schemas.microsoft.com/office/mac/drawingml/2011/main" val="1"/>
+              <ma14:wrappingTextBoxFlag xmlns:ma14="http://schemas.microsoft.com/office/mac/drawingml/2011/main" xmlns="" val="1"/>
             </a:ext>
           </a:extLst>
         </p:spPr>
@@ -15577,7 +15577,7 @@
           </a:ln>
           <a:extLst>
             <a:ext uri="{C572A759-6A51-4108-AA02-DFA0A04FC94B}">
-              <ma14:wrappingTextBoxFlag xmlns="" xmlns:ma14="http://schemas.microsoft.com/office/mac/drawingml/2011/main" val="1"/>
+              <ma14:wrappingTextBoxFlag xmlns:ma14="http://schemas.microsoft.com/office/mac/drawingml/2011/main" xmlns="" val="1"/>
             </a:ext>
           </a:extLst>
         </p:spPr>
@@ -17168,7 +17168,7 @@
 </file>
 
 <file path=ppt/slides/slide27.xml><?xml version="1.0" encoding="utf-8"?>
-<p:sld xmlns:a="http://schemas.openxmlformats.org/drawingml/2006/main" xmlns:r="http://schemas.openxmlformats.org/officeDocument/2006/relationships" xmlns:p="http://schemas.openxmlformats.org/presentationml/2006/main">
+<p:sld xmlns:a="http://schemas.openxmlformats.org/drawingml/2006/main" xmlns:r="http://schemas.openxmlformats.org/officeDocument/2006/relationships" xmlns:p="http://schemas.openxmlformats.org/presentationml/2006/main" show="0">
   <p:cSld>
     <p:spTree>
       <p:nvGrpSpPr>
@@ -17790,7 +17790,7 @@
           </a:ln>
           <a:extLst>
             <a:ext uri="{C572A759-6A51-4108-AA02-DFA0A04FC94B}">
-              <ma14:wrappingTextBoxFlag xmlns="" xmlns:ma14="http://schemas.microsoft.com/office/mac/drawingml/2011/main" val="1"/>
+              <ma14:wrappingTextBoxFlag xmlns:ma14="http://schemas.microsoft.com/office/mac/drawingml/2011/main" xmlns="" val="1"/>
             </a:ext>
           </a:extLst>
         </p:spPr>
@@ -17944,7 +17944,7 @@
           </a:ln>
           <a:extLst>
             <a:ext uri="{C572A759-6A51-4108-AA02-DFA0A04FC94B}">
-              <ma14:wrappingTextBoxFlag xmlns="" xmlns:ma14="http://schemas.microsoft.com/office/mac/drawingml/2011/main" val="1"/>
+              <ma14:wrappingTextBoxFlag xmlns:ma14="http://schemas.microsoft.com/office/mac/drawingml/2011/main" xmlns="" val="1"/>
             </a:ext>
           </a:extLst>
         </p:spPr>
@@ -18036,7 +18036,7 @@
           </a:ln>
           <a:extLst>
             <a:ext uri="{C572A759-6A51-4108-AA02-DFA0A04FC94B}">
-              <ma14:wrappingTextBoxFlag xmlns="" xmlns:ma14="http://schemas.microsoft.com/office/mac/drawingml/2011/main" val="1"/>
+              <ma14:wrappingTextBoxFlag xmlns:ma14="http://schemas.microsoft.com/office/mac/drawingml/2011/main" xmlns="" val="1"/>
             </a:ext>
           </a:extLst>
         </p:spPr>
@@ -18144,7 +18144,7 @@
           </a:ln>
           <a:extLst>
             <a:ext uri="{C572A759-6A51-4108-AA02-DFA0A04FC94B}">
-              <ma14:wrappingTextBoxFlag xmlns="" xmlns:ma14="http://schemas.microsoft.com/office/mac/drawingml/2011/main" val="1"/>
+              <ma14:wrappingTextBoxFlag xmlns:ma14="http://schemas.microsoft.com/office/mac/drawingml/2011/main" xmlns="" val="1"/>
             </a:ext>
           </a:extLst>
         </p:spPr>
@@ -19174,7 +19174,7 @@
           </a:ln>
           <a:extLst>
             <a:ext uri="{C572A759-6A51-4108-AA02-DFA0A04FC94B}">
-              <ma14:wrappingTextBoxFlag xmlns="" xmlns:ma14="http://schemas.microsoft.com/office/mac/drawingml/2011/main" val="1"/>
+              <ma14:wrappingTextBoxFlag xmlns:ma14="http://schemas.microsoft.com/office/mac/drawingml/2011/main" xmlns="" val="1"/>
             </a:ext>
           </a:extLst>
         </p:spPr>
@@ -19413,7 +19413,7 @@
           </a:ln>
           <a:extLst>
             <a:ext uri="{C572A759-6A51-4108-AA02-DFA0A04FC94B}">
-              <ma14:wrappingTextBoxFlag xmlns="" xmlns:ma14="http://schemas.microsoft.com/office/mac/drawingml/2011/main" val="1"/>
+              <ma14:wrappingTextBoxFlag xmlns:ma14="http://schemas.microsoft.com/office/mac/drawingml/2011/main" xmlns="" val="1"/>
             </a:ext>
           </a:extLst>
         </p:spPr>
@@ -19537,7 +19537,7 @@
           </a:ln>
           <a:extLst>
             <a:ext uri="{C572A759-6A51-4108-AA02-DFA0A04FC94B}">
-              <ma14:wrappingTextBoxFlag xmlns="" xmlns:ma14="http://schemas.microsoft.com/office/mac/drawingml/2011/main" val="1"/>
+              <ma14:wrappingTextBoxFlag xmlns:ma14="http://schemas.microsoft.com/office/mac/drawingml/2011/main" xmlns="" val="1"/>
             </a:ext>
           </a:extLst>
         </p:spPr>

</xml_diff>